<commit_message>
Work on describing example experimental setups
</commit_message>
<xml_diff>
--- a/illustrations/test-response-recording.pptx
+++ b/illustrations/test-response-recording.pptx
@@ -9,6 +9,8 @@
     <p:sldId id="257" r:id="rId3"/>
     <p:sldId id="258" r:id="rId4"/>
     <p:sldId id="259" r:id="rId5"/>
+    <p:sldId id="260" r:id="rId6"/>
+    <p:sldId id="261" r:id="rId7"/>
   </p:sldIdLst>
   <p:sldSz cx="12192000" cy="6858000"/>
   <p:notesSz cx="6858000" cy="9144000"/>
@@ -107,6 +109,11 @@
       </a:defRPr>
     </a:lvl9pPr>
   </p:defaultTextStyle>
+  <p:extLst>
+    <p:ext uri="{EFAFB233-063F-42B5-8137-9DF3F51BA10A}">
+      <p15:sldGuideLst xmlns:p15="http://schemas.microsoft.com/office/powerpoint/2012/main"/>
+    </p:ext>
+  </p:extLst>
 </p:presentation>
 </file>
 
@@ -259,7 +266,7 @@
           <a:p>
             <a:fld id="{1F4D6754-5EC6-489C-99C4-13243F598B17}" type="datetimeFigureOut">
               <a:rPr lang="en-DK" smtClean="0"/>
-              <a:t>01/11/2025</a:t>
+              <a:t>09/11/2025</a:t>
             </a:fld>
             <a:endParaRPr lang="en-DK"/>
           </a:p>
@@ -459,7 +466,7 @@
           <a:p>
             <a:fld id="{1F4D6754-5EC6-489C-99C4-13243F598B17}" type="datetimeFigureOut">
               <a:rPr lang="en-DK" smtClean="0"/>
-              <a:t>01/11/2025</a:t>
+              <a:t>09/11/2025</a:t>
             </a:fld>
             <a:endParaRPr lang="en-DK"/>
           </a:p>
@@ -669,7 +676,7 @@
           <a:p>
             <a:fld id="{1F4D6754-5EC6-489C-99C4-13243F598B17}" type="datetimeFigureOut">
               <a:rPr lang="en-DK" smtClean="0"/>
-              <a:t>01/11/2025</a:t>
+              <a:t>09/11/2025</a:t>
             </a:fld>
             <a:endParaRPr lang="en-DK"/>
           </a:p>
@@ -869,7 +876,7 @@
           <a:p>
             <a:fld id="{1F4D6754-5EC6-489C-99C4-13243F598B17}" type="datetimeFigureOut">
               <a:rPr lang="en-DK" smtClean="0"/>
-              <a:t>01/11/2025</a:t>
+              <a:t>09/11/2025</a:t>
             </a:fld>
             <a:endParaRPr lang="en-DK"/>
           </a:p>
@@ -1145,7 +1152,7 @@
           <a:p>
             <a:fld id="{1F4D6754-5EC6-489C-99C4-13243F598B17}" type="datetimeFigureOut">
               <a:rPr lang="en-DK" smtClean="0"/>
-              <a:t>01/11/2025</a:t>
+              <a:t>09/11/2025</a:t>
             </a:fld>
             <a:endParaRPr lang="en-DK"/>
           </a:p>
@@ -1413,7 +1420,7 @@
           <a:p>
             <a:fld id="{1F4D6754-5EC6-489C-99C4-13243F598B17}" type="datetimeFigureOut">
               <a:rPr lang="en-DK" smtClean="0"/>
-              <a:t>01/11/2025</a:t>
+              <a:t>09/11/2025</a:t>
             </a:fld>
             <a:endParaRPr lang="en-DK"/>
           </a:p>
@@ -1828,7 +1835,7 @@
           <a:p>
             <a:fld id="{1F4D6754-5EC6-489C-99C4-13243F598B17}" type="datetimeFigureOut">
               <a:rPr lang="en-DK" smtClean="0"/>
-              <a:t>01/11/2025</a:t>
+              <a:t>09/11/2025</a:t>
             </a:fld>
             <a:endParaRPr lang="en-DK"/>
           </a:p>
@@ -1970,7 +1977,7 @@
           <a:p>
             <a:fld id="{1F4D6754-5EC6-489C-99C4-13243F598B17}" type="datetimeFigureOut">
               <a:rPr lang="en-DK" smtClean="0"/>
-              <a:t>01/11/2025</a:t>
+              <a:t>09/11/2025</a:t>
             </a:fld>
             <a:endParaRPr lang="en-DK"/>
           </a:p>
@@ -2083,7 +2090,7 @@
           <a:p>
             <a:fld id="{1F4D6754-5EC6-489C-99C4-13243F598B17}" type="datetimeFigureOut">
               <a:rPr lang="en-DK" smtClean="0"/>
-              <a:t>01/11/2025</a:t>
+              <a:t>09/11/2025</a:t>
             </a:fld>
             <a:endParaRPr lang="en-DK"/>
           </a:p>
@@ -2396,7 +2403,7 @@
           <a:p>
             <a:fld id="{1F4D6754-5EC6-489C-99C4-13243F598B17}" type="datetimeFigureOut">
               <a:rPr lang="en-DK" smtClean="0"/>
-              <a:t>01/11/2025</a:t>
+              <a:t>09/11/2025</a:t>
             </a:fld>
             <a:endParaRPr lang="en-DK"/>
           </a:p>
@@ -2685,7 +2692,7 @@
           <a:p>
             <a:fld id="{1F4D6754-5EC6-489C-99C4-13243F598B17}" type="datetimeFigureOut">
               <a:rPr lang="en-DK" smtClean="0"/>
-              <a:t>01/11/2025</a:t>
+              <a:t>09/11/2025</a:t>
             </a:fld>
             <a:endParaRPr lang="en-DK"/>
           </a:p>
@@ -2928,7 +2935,7 @@
           <a:p>
             <a:fld id="{1F4D6754-5EC6-489C-99C4-13243F598B17}" type="datetimeFigureOut">
               <a:rPr lang="en-DK" smtClean="0"/>
-              <a:t>01/11/2025</a:t>
+              <a:t>09/11/2025</a:t>
             </a:fld>
             <a:endParaRPr lang="en-DK"/>
           </a:p>
@@ -4315,6 +4322,1852 @@
     <p:extLst>
       <p:ext uri="{BB962C8B-B14F-4D97-AF65-F5344CB8AC3E}">
         <p14:creationId xmlns:p14="http://schemas.microsoft.com/office/powerpoint/2010/main" val="1324649663"/>
+      </p:ext>
+    </p:extLst>
+  </p:cSld>
+  <p:clrMapOvr>
+    <a:masterClrMapping/>
+  </p:clrMapOvr>
+</p:sld>
+</file>
+
+<file path=ppt/slides/slide5.xml><?xml version="1.0" encoding="utf-8"?>
+<p:sld xmlns:a="http://schemas.openxmlformats.org/drawingml/2006/main" xmlns:r="http://schemas.openxmlformats.org/officeDocument/2006/relationships" xmlns:p="http://schemas.openxmlformats.org/presentationml/2006/main">
+  <p:cSld>
+    <p:spTree>
+      <p:nvGrpSpPr>
+        <p:cNvPr id="1" name=""/>
+        <p:cNvGrpSpPr/>
+        <p:nvPr/>
+      </p:nvGrpSpPr>
+      <p:grpSpPr>
+        <a:xfrm>
+          <a:off x="0" y="0"/>
+          <a:ext cx="0" cy="0"/>
+          <a:chOff x="0" y="0"/>
+          <a:chExt cx="0" cy="0"/>
+        </a:xfrm>
+      </p:grpSpPr>
+      <p:grpSp>
+        <p:nvGrpSpPr>
+          <p:cNvPr id="2" name="Group 1">
+            <a:extLst>
+              <a:ext uri="{FF2B5EF4-FFF2-40B4-BE49-F238E27FC236}">
+                <a16:creationId xmlns:a16="http://schemas.microsoft.com/office/drawing/2014/main" id="{95337535-962B-4DA1-D76F-ED5A0C625335}"/>
+              </a:ext>
+            </a:extLst>
+          </p:cNvPr>
+          <p:cNvGrpSpPr/>
+          <p:nvPr/>
+        </p:nvGrpSpPr>
+        <p:grpSpPr>
+          <a:xfrm>
+            <a:off x="3971360" y="1014902"/>
+            <a:ext cx="4249280" cy="1877731"/>
+            <a:chOff x="828110" y="623234"/>
+            <a:chExt cx="4249280" cy="1877731"/>
+          </a:xfrm>
+        </p:grpSpPr>
+        <p:pic>
+          <p:nvPicPr>
+            <p:cNvPr id="3" name="Picture 2">
+              <a:extLst>
+                <a:ext uri="{FF2B5EF4-FFF2-40B4-BE49-F238E27FC236}">
+                  <a16:creationId xmlns:a16="http://schemas.microsoft.com/office/drawing/2014/main" id="{666CE9B5-6654-0028-EB19-A9560AEFEAFD}"/>
+                </a:ext>
+              </a:extLst>
+            </p:cNvPr>
+            <p:cNvPicPr>
+              <a:picLocks noChangeAspect="1"/>
+            </p:cNvPicPr>
+            <p:nvPr/>
+          </p:nvPicPr>
+          <p:blipFill>
+            <a:blip r:embed="rId2"/>
+            <a:stretch>
+              <a:fillRect/>
+            </a:stretch>
+          </p:blipFill>
+          <p:spPr>
+            <a:xfrm>
+              <a:off x="828110" y="623234"/>
+              <a:ext cx="4249280" cy="1877731"/>
+            </a:xfrm>
+            <a:prstGeom prst="rect">
+              <a:avLst/>
+            </a:prstGeom>
+          </p:spPr>
+        </p:pic>
+        <p:sp>
+          <p:nvSpPr>
+            <p:cNvPr id="4" name="Rectangle 3">
+              <a:extLst>
+                <a:ext uri="{FF2B5EF4-FFF2-40B4-BE49-F238E27FC236}">
+                  <a16:creationId xmlns:a16="http://schemas.microsoft.com/office/drawing/2014/main" id="{79667107-A17C-E448-2295-3E4EB848137A}"/>
+                </a:ext>
+              </a:extLst>
+            </p:cNvPr>
+            <p:cNvSpPr/>
+            <p:nvPr/>
+          </p:nvSpPr>
+          <p:spPr>
+            <a:xfrm>
+              <a:off x="1066800" y="2386665"/>
+              <a:ext cx="104775" cy="104775"/>
+            </a:xfrm>
+            <a:prstGeom prst="rect">
+              <a:avLst/>
+            </a:prstGeom>
+            <a:noFill/>
+            <a:ln>
+              <a:noFill/>
+            </a:ln>
+          </p:spPr>
+          <p:style>
+            <a:lnRef idx="2">
+              <a:schemeClr val="accent1">
+                <a:shade val="15000"/>
+              </a:schemeClr>
+            </a:lnRef>
+            <a:fillRef idx="1">
+              <a:schemeClr val="accent1"/>
+            </a:fillRef>
+            <a:effectRef idx="0">
+              <a:schemeClr val="accent1"/>
+            </a:effectRef>
+            <a:fontRef idx="minor">
+              <a:schemeClr val="lt1"/>
+            </a:fontRef>
+          </p:style>
+          <p:txBody>
+            <a:bodyPr rtlCol="0" anchor="ctr"/>
+            <a:lstStyle/>
+            <a:p>
+              <a:pPr algn="ctr"/>
+              <a:endParaRPr lang="en-DK"/>
+            </a:p>
+          </p:txBody>
+        </p:sp>
+        <p:sp>
+          <p:nvSpPr>
+            <p:cNvPr id="5" name="Rectangle 4">
+              <a:extLst>
+                <a:ext uri="{FF2B5EF4-FFF2-40B4-BE49-F238E27FC236}">
+                  <a16:creationId xmlns:a16="http://schemas.microsoft.com/office/drawing/2014/main" id="{5F237C17-F1BF-691B-310E-0900180C25C0}"/>
+                </a:ext>
+              </a:extLst>
+            </p:cNvPr>
+            <p:cNvSpPr/>
+            <p:nvPr/>
+          </p:nvSpPr>
+          <p:spPr>
+            <a:xfrm>
+              <a:off x="2019300" y="2386665"/>
+              <a:ext cx="104775" cy="104775"/>
+            </a:xfrm>
+            <a:prstGeom prst="rect">
+              <a:avLst/>
+            </a:prstGeom>
+            <a:noFill/>
+            <a:ln>
+              <a:noFill/>
+            </a:ln>
+          </p:spPr>
+          <p:style>
+            <a:lnRef idx="2">
+              <a:schemeClr val="accent1">
+                <a:shade val="15000"/>
+              </a:schemeClr>
+            </a:lnRef>
+            <a:fillRef idx="1">
+              <a:schemeClr val="accent1"/>
+            </a:fillRef>
+            <a:effectRef idx="0">
+              <a:schemeClr val="accent1"/>
+            </a:effectRef>
+            <a:fontRef idx="minor">
+              <a:schemeClr val="lt1"/>
+            </a:fontRef>
+          </p:style>
+          <p:txBody>
+            <a:bodyPr rtlCol="0" anchor="ctr"/>
+            <a:lstStyle/>
+            <a:p>
+              <a:pPr algn="ctr"/>
+              <a:endParaRPr lang="en-DK"/>
+            </a:p>
+          </p:txBody>
+        </p:sp>
+        <p:sp>
+          <p:nvSpPr>
+            <p:cNvPr id="6" name="Rectangle 5">
+              <a:extLst>
+                <a:ext uri="{FF2B5EF4-FFF2-40B4-BE49-F238E27FC236}">
+                  <a16:creationId xmlns:a16="http://schemas.microsoft.com/office/drawing/2014/main" id="{016E0BC2-F226-4E64-9390-3B448C049B5B}"/>
+                </a:ext>
+              </a:extLst>
+            </p:cNvPr>
+            <p:cNvSpPr/>
+            <p:nvPr/>
+          </p:nvSpPr>
+          <p:spPr>
+            <a:xfrm>
+              <a:off x="2781300" y="2386665"/>
+              <a:ext cx="104775" cy="104775"/>
+            </a:xfrm>
+            <a:prstGeom prst="rect">
+              <a:avLst/>
+            </a:prstGeom>
+            <a:noFill/>
+            <a:ln>
+              <a:noFill/>
+            </a:ln>
+          </p:spPr>
+          <p:style>
+            <a:lnRef idx="2">
+              <a:schemeClr val="accent1">
+                <a:shade val="15000"/>
+              </a:schemeClr>
+            </a:lnRef>
+            <a:fillRef idx="1">
+              <a:schemeClr val="accent1"/>
+            </a:fillRef>
+            <a:effectRef idx="0">
+              <a:schemeClr val="accent1"/>
+            </a:effectRef>
+            <a:fontRef idx="minor">
+              <a:schemeClr val="lt1"/>
+            </a:fontRef>
+          </p:style>
+          <p:txBody>
+            <a:bodyPr rtlCol="0" anchor="ctr"/>
+            <a:lstStyle/>
+            <a:p>
+              <a:pPr algn="ctr"/>
+              <a:endParaRPr lang="en-DK"/>
+            </a:p>
+          </p:txBody>
+        </p:sp>
+        <p:sp>
+          <p:nvSpPr>
+            <p:cNvPr id="7" name="Rectangle 6">
+              <a:extLst>
+                <a:ext uri="{FF2B5EF4-FFF2-40B4-BE49-F238E27FC236}">
+                  <a16:creationId xmlns:a16="http://schemas.microsoft.com/office/drawing/2014/main" id="{0520AA74-B526-EC35-ECFC-20C1AE51648C}"/>
+                </a:ext>
+              </a:extLst>
+            </p:cNvPr>
+            <p:cNvSpPr/>
+            <p:nvPr/>
+          </p:nvSpPr>
+          <p:spPr>
+            <a:xfrm>
+              <a:off x="3105432" y="2386665"/>
+              <a:ext cx="104775" cy="104775"/>
+            </a:xfrm>
+            <a:prstGeom prst="rect">
+              <a:avLst/>
+            </a:prstGeom>
+            <a:noFill/>
+            <a:ln>
+              <a:noFill/>
+            </a:ln>
+          </p:spPr>
+          <p:style>
+            <a:lnRef idx="2">
+              <a:schemeClr val="accent1">
+                <a:shade val="15000"/>
+              </a:schemeClr>
+            </a:lnRef>
+            <a:fillRef idx="1">
+              <a:schemeClr val="accent1"/>
+            </a:fillRef>
+            <a:effectRef idx="0">
+              <a:schemeClr val="accent1"/>
+            </a:effectRef>
+            <a:fontRef idx="minor">
+              <a:schemeClr val="lt1"/>
+            </a:fontRef>
+          </p:style>
+          <p:txBody>
+            <a:bodyPr rtlCol="0" anchor="ctr"/>
+            <a:lstStyle/>
+            <a:p>
+              <a:pPr algn="ctr"/>
+              <a:endParaRPr lang="en-DK"/>
+            </a:p>
+          </p:txBody>
+        </p:sp>
+        <p:sp>
+          <p:nvSpPr>
+            <p:cNvPr id="8" name="Rectangle 7">
+              <a:extLst>
+                <a:ext uri="{FF2B5EF4-FFF2-40B4-BE49-F238E27FC236}">
+                  <a16:creationId xmlns:a16="http://schemas.microsoft.com/office/drawing/2014/main" id="{92D3CBF5-467C-B3CA-84B0-C9671CA0FECA}"/>
+                </a:ext>
+              </a:extLst>
+            </p:cNvPr>
+            <p:cNvSpPr/>
+            <p:nvPr/>
+          </p:nvSpPr>
+          <p:spPr>
+            <a:xfrm>
+              <a:off x="3490912" y="2386665"/>
+              <a:ext cx="104775" cy="104775"/>
+            </a:xfrm>
+            <a:prstGeom prst="rect">
+              <a:avLst/>
+            </a:prstGeom>
+            <a:noFill/>
+            <a:ln>
+              <a:noFill/>
+            </a:ln>
+          </p:spPr>
+          <p:style>
+            <a:lnRef idx="2">
+              <a:schemeClr val="accent1">
+                <a:shade val="15000"/>
+              </a:schemeClr>
+            </a:lnRef>
+            <a:fillRef idx="1">
+              <a:schemeClr val="accent1"/>
+            </a:fillRef>
+            <a:effectRef idx="0">
+              <a:schemeClr val="accent1"/>
+            </a:effectRef>
+            <a:fontRef idx="minor">
+              <a:schemeClr val="lt1"/>
+            </a:fontRef>
+          </p:style>
+          <p:txBody>
+            <a:bodyPr rtlCol="0" anchor="ctr"/>
+            <a:lstStyle/>
+            <a:p>
+              <a:pPr algn="ctr"/>
+              <a:endParaRPr lang="en-DK"/>
+            </a:p>
+          </p:txBody>
+        </p:sp>
+        <p:sp>
+          <p:nvSpPr>
+            <p:cNvPr id="9" name="Rectangle 8">
+              <a:extLst>
+                <a:ext uri="{FF2B5EF4-FFF2-40B4-BE49-F238E27FC236}">
+                  <a16:creationId xmlns:a16="http://schemas.microsoft.com/office/drawing/2014/main" id="{76B7AE9D-1960-0896-E1A5-188AC77A97EB}"/>
+                </a:ext>
+              </a:extLst>
+            </p:cNvPr>
+            <p:cNvSpPr/>
+            <p:nvPr/>
+          </p:nvSpPr>
+          <p:spPr>
+            <a:xfrm>
+              <a:off x="3803421" y="2386665"/>
+              <a:ext cx="104775" cy="104775"/>
+            </a:xfrm>
+            <a:prstGeom prst="rect">
+              <a:avLst/>
+            </a:prstGeom>
+            <a:noFill/>
+            <a:ln>
+              <a:noFill/>
+            </a:ln>
+          </p:spPr>
+          <p:style>
+            <a:lnRef idx="2">
+              <a:schemeClr val="accent1">
+                <a:shade val="15000"/>
+              </a:schemeClr>
+            </a:lnRef>
+            <a:fillRef idx="1">
+              <a:schemeClr val="accent1"/>
+            </a:fillRef>
+            <a:effectRef idx="0">
+              <a:schemeClr val="accent1"/>
+            </a:effectRef>
+            <a:fontRef idx="minor">
+              <a:schemeClr val="lt1"/>
+            </a:fontRef>
+          </p:style>
+          <p:txBody>
+            <a:bodyPr rtlCol="0" anchor="ctr"/>
+            <a:lstStyle/>
+            <a:p>
+              <a:pPr algn="ctr"/>
+              <a:endParaRPr lang="en-DK"/>
+            </a:p>
+          </p:txBody>
+        </p:sp>
+        <p:sp>
+          <p:nvSpPr>
+            <p:cNvPr id="10" name="Rectangle 9">
+              <a:extLst>
+                <a:ext uri="{FF2B5EF4-FFF2-40B4-BE49-F238E27FC236}">
+                  <a16:creationId xmlns:a16="http://schemas.microsoft.com/office/drawing/2014/main" id="{9CD70A62-3DD8-A42D-AB30-D0E9639D93E6}"/>
+                </a:ext>
+              </a:extLst>
+            </p:cNvPr>
+            <p:cNvSpPr/>
+            <p:nvPr/>
+          </p:nvSpPr>
+          <p:spPr>
+            <a:xfrm>
+              <a:off x="4258522" y="2386665"/>
+              <a:ext cx="104775" cy="104775"/>
+            </a:xfrm>
+            <a:prstGeom prst="rect">
+              <a:avLst/>
+            </a:prstGeom>
+            <a:noFill/>
+            <a:ln>
+              <a:noFill/>
+            </a:ln>
+          </p:spPr>
+          <p:style>
+            <a:lnRef idx="2">
+              <a:schemeClr val="accent1">
+                <a:shade val="15000"/>
+              </a:schemeClr>
+            </a:lnRef>
+            <a:fillRef idx="1">
+              <a:schemeClr val="accent1"/>
+            </a:fillRef>
+            <a:effectRef idx="0">
+              <a:schemeClr val="accent1"/>
+            </a:effectRef>
+            <a:fontRef idx="minor">
+              <a:schemeClr val="lt1"/>
+            </a:fontRef>
+          </p:style>
+          <p:txBody>
+            <a:bodyPr rtlCol="0" anchor="ctr"/>
+            <a:lstStyle/>
+            <a:p>
+              <a:pPr algn="ctr"/>
+              <a:endParaRPr lang="en-DK"/>
+            </a:p>
+          </p:txBody>
+        </p:sp>
+        <p:sp>
+          <p:nvSpPr>
+            <p:cNvPr id="11" name="Rectangle 10">
+              <a:extLst>
+                <a:ext uri="{FF2B5EF4-FFF2-40B4-BE49-F238E27FC236}">
+                  <a16:creationId xmlns:a16="http://schemas.microsoft.com/office/drawing/2014/main" id="{92576C61-ECEA-D2E9-CAE0-6B14589458FB}"/>
+                </a:ext>
+              </a:extLst>
+            </p:cNvPr>
+            <p:cNvSpPr/>
+            <p:nvPr/>
+          </p:nvSpPr>
+          <p:spPr>
+            <a:xfrm>
+              <a:off x="4734489" y="2386665"/>
+              <a:ext cx="104775" cy="104775"/>
+            </a:xfrm>
+            <a:prstGeom prst="rect">
+              <a:avLst/>
+            </a:prstGeom>
+            <a:noFill/>
+            <a:ln>
+              <a:noFill/>
+            </a:ln>
+          </p:spPr>
+          <p:style>
+            <a:lnRef idx="2">
+              <a:schemeClr val="accent1">
+                <a:shade val="15000"/>
+              </a:schemeClr>
+            </a:lnRef>
+            <a:fillRef idx="1">
+              <a:schemeClr val="accent1"/>
+            </a:fillRef>
+            <a:effectRef idx="0">
+              <a:schemeClr val="accent1"/>
+            </a:effectRef>
+            <a:fontRef idx="minor">
+              <a:schemeClr val="lt1"/>
+            </a:fontRef>
+          </p:style>
+          <p:txBody>
+            <a:bodyPr rtlCol="0" anchor="ctr"/>
+            <a:lstStyle/>
+            <a:p>
+              <a:pPr algn="ctr"/>
+              <a:endParaRPr lang="en-DK"/>
+            </a:p>
+          </p:txBody>
+        </p:sp>
+      </p:grpSp>
+      <p:grpSp>
+        <p:nvGrpSpPr>
+          <p:cNvPr id="12" name="Group 11">
+            <a:extLst>
+              <a:ext uri="{FF2B5EF4-FFF2-40B4-BE49-F238E27FC236}">
+                <a16:creationId xmlns:a16="http://schemas.microsoft.com/office/drawing/2014/main" id="{961002EE-C041-5783-53F3-225A907FBF81}"/>
+              </a:ext>
+            </a:extLst>
+          </p:cNvPr>
+          <p:cNvGrpSpPr/>
+          <p:nvPr/>
+        </p:nvGrpSpPr>
+        <p:grpSpPr>
+          <a:xfrm>
+            <a:off x="671759" y="2785880"/>
+            <a:ext cx="2749534" cy="1676545"/>
+            <a:chOff x="469970" y="4181402"/>
+            <a:chExt cx="2749534" cy="1676545"/>
+          </a:xfrm>
+        </p:grpSpPr>
+        <p:pic>
+          <p:nvPicPr>
+            <p:cNvPr id="13" name="Picture 12">
+              <a:extLst>
+                <a:ext uri="{FF2B5EF4-FFF2-40B4-BE49-F238E27FC236}">
+                  <a16:creationId xmlns:a16="http://schemas.microsoft.com/office/drawing/2014/main" id="{878358E4-23D8-3D73-8E6F-9D134199D55A}"/>
+                </a:ext>
+              </a:extLst>
+            </p:cNvPr>
+            <p:cNvPicPr>
+              <a:picLocks noChangeAspect="1"/>
+            </p:cNvPicPr>
+            <p:nvPr/>
+          </p:nvPicPr>
+          <p:blipFill>
+            <a:blip r:embed="rId3"/>
+            <a:stretch>
+              <a:fillRect/>
+            </a:stretch>
+          </p:blipFill>
+          <p:spPr>
+            <a:xfrm>
+              <a:off x="469970" y="4181402"/>
+              <a:ext cx="2749534" cy="1676545"/>
+            </a:xfrm>
+            <a:prstGeom prst="rect">
+              <a:avLst/>
+            </a:prstGeom>
+          </p:spPr>
+        </p:pic>
+        <p:sp>
+          <p:nvSpPr>
+            <p:cNvPr id="14" name="Rectangle 13">
+              <a:extLst>
+                <a:ext uri="{FF2B5EF4-FFF2-40B4-BE49-F238E27FC236}">
+                  <a16:creationId xmlns:a16="http://schemas.microsoft.com/office/drawing/2014/main" id="{DE3DD7C6-1DE1-5F99-EE36-B256EAB78CA8}"/>
+                </a:ext>
+              </a:extLst>
+            </p:cNvPr>
+            <p:cNvSpPr/>
+            <p:nvPr/>
+          </p:nvSpPr>
+          <p:spPr>
+            <a:xfrm>
+              <a:off x="3123247" y="4323267"/>
+              <a:ext cx="85725" cy="95250"/>
+            </a:xfrm>
+            <a:prstGeom prst="rect">
+              <a:avLst/>
+            </a:prstGeom>
+            <a:noFill/>
+            <a:ln>
+              <a:noFill/>
+            </a:ln>
+          </p:spPr>
+          <p:style>
+            <a:lnRef idx="2">
+              <a:schemeClr val="accent1">
+                <a:shade val="15000"/>
+              </a:schemeClr>
+            </a:lnRef>
+            <a:fillRef idx="1">
+              <a:schemeClr val="accent1"/>
+            </a:fillRef>
+            <a:effectRef idx="0">
+              <a:schemeClr val="accent1"/>
+            </a:effectRef>
+            <a:fontRef idx="minor">
+              <a:schemeClr val="lt1"/>
+            </a:fontRef>
+          </p:style>
+          <p:txBody>
+            <a:bodyPr rtlCol="0" anchor="ctr"/>
+            <a:lstStyle/>
+            <a:p>
+              <a:pPr algn="ctr"/>
+              <a:endParaRPr lang="en-DK"/>
+            </a:p>
+          </p:txBody>
+        </p:sp>
+        <p:sp>
+          <p:nvSpPr>
+            <p:cNvPr id="15" name="Rectangle 14">
+              <a:extLst>
+                <a:ext uri="{FF2B5EF4-FFF2-40B4-BE49-F238E27FC236}">
+                  <a16:creationId xmlns:a16="http://schemas.microsoft.com/office/drawing/2014/main" id="{A6726B00-3E77-7DBC-AA54-316529F64C10}"/>
+                </a:ext>
+              </a:extLst>
+            </p:cNvPr>
+            <p:cNvSpPr/>
+            <p:nvPr/>
+          </p:nvSpPr>
+          <p:spPr>
+            <a:xfrm>
+              <a:off x="3123247" y="4566511"/>
+              <a:ext cx="85725" cy="95250"/>
+            </a:xfrm>
+            <a:prstGeom prst="rect">
+              <a:avLst/>
+            </a:prstGeom>
+            <a:noFill/>
+            <a:ln>
+              <a:noFill/>
+            </a:ln>
+          </p:spPr>
+          <p:style>
+            <a:lnRef idx="2">
+              <a:schemeClr val="accent1">
+                <a:shade val="15000"/>
+              </a:schemeClr>
+            </a:lnRef>
+            <a:fillRef idx="1">
+              <a:schemeClr val="accent1"/>
+            </a:fillRef>
+            <a:effectRef idx="0">
+              <a:schemeClr val="accent1"/>
+            </a:effectRef>
+            <a:fontRef idx="minor">
+              <a:schemeClr val="lt1"/>
+            </a:fontRef>
+          </p:style>
+          <p:txBody>
+            <a:bodyPr rtlCol="0" anchor="ctr"/>
+            <a:lstStyle/>
+            <a:p>
+              <a:pPr algn="ctr"/>
+              <a:endParaRPr lang="en-DK"/>
+            </a:p>
+          </p:txBody>
+        </p:sp>
+        <p:sp>
+          <p:nvSpPr>
+            <p:cNvPr id="16" name="Rectangle 15">
+              <a:extLst>
+                <a:ext uri="{FF2B5EF4-FFF2-40B4-BE49-F238E27FC236}">
+                  <a16:creationId xmlns:a16="http://schemas.microsoft.com/office/drawing/2014/main" id="{34BDA034-BB54-A514-DDF4-EFA1F7ED4879}"/>
+                </a:ext>
+              </a:extLst>
+            </p:cNvPr>
+            <p:cNvSpPr/>
+            <p:nvPr/>
+          </p:nvSpPr>
+          <p:spPr>
+            <a:xfrm>
+              <a:off x="3123247" y="4803626"/>
+              <a:ext cx="85725" cy="95250"/>
+            </a:xfrm>
+            <a:prstGeom prst="rect">
+              <a:avLst/>
+            </a:prstGeom>
+            <a:noFill/>
+            <a:ln>
+              <a:noFill/>
+            </a:ln>
+          </p:spPr>
+          <p:style>
+            <a:lnRef idx="2">
+              <a:schemeClr val="accent1">
+                <a:shade val="15000"/>
+              </a:schemeClr>
+            </a:lnRef>
+            <a:fillRef idx="1">
+              <a:schemeClr val="accent1"/>
+            </a:fillRef>
+            <a:effectRef idx="0">
+              <a:schemeClr val="accent1"/>
+            </a:effectRef>
+            <a:fontRef idx="minor">
+              <a:schemeClr val="lt1"/>
+            </a:fontRef>
+          </p:style>
+          <p:txBody>
+            <a:bodyPr rtlCol="0" anchor="ctr"/>
+            <a:lstStyle/>
+            <a:p>
+              <a:pPr algn="ctr"/>
+              <a:endParaRPr lang="en-DK"/>
+            </a:p>
+          </p:txBody>
+        </p:sp>
+        <p:sp>
+          <p:nvSpPr>
+            <p:cNvPr id="17" name="Rectangle 16">
+              <a:extLst>
+                <a:ext uri="{FF2B5EF4-FFF2-40B4-BE49-F238E27FC236}">
+                  <a16:creationId xmlns:a16="http://schemas.microsoft.com/office/drawing/2014/main" id="{581CCB2C-600C-8C64-AB2D-5F910333422A}"/>
+                </a:ext>
+              </a:extLst>
+            </p:cNvPr>
+            <p:cNvSpPr/>
+            <p:nvPr/>
+          </p:nvSpPr>
+          <p:spPr>
+            <a:xfrm>
+              <a:off x="3123247" y="5018295"/>
+              <a:ext cx="85725" cy="95250"/>
+            </a:xfrm>
+            <a:prstGeom prst="rect">
+              <a:avLst/>
+            </a:prstGeom>
+            <a:noFill/>
+            <a:ln>
+              <a:noFill/>
+            </a:ln>
+          </p:spPr>
+          <p:style>
+            <a:lnRef idx="2">
+              <a:schemeClr val="accent1">
+                <a:shade val="15000"/>
+              </a:schemeClr>
+            </a:lnRef>
+            <a:fillRef idx="1">
+              <a:schemeClr val="accent1"/>
+            </a:fillRef>
+            <a:effectRef idx="0">
+              <a:schemeClr val="accent1"/>
+            </a:effectRef>
+            <a:fontRef idx="minor">
+              <a:schemeClr val="lt1"/>
+            </a:fontRef>
+          </p:style>
+          <p:txBody>
+            <a:bodyPr rtlCol="0" anchor="ctr"/>
+            <a:lstStyle/>
+            <a:p>
+              <a:pPr algn="ctr"/>
+              <a:endParaRPr lang="en-DK"/>
+            </a:p>
+          </p:txBody>
+        </p:sp>
+        <p:sp>
+          <p:nvSpPr>
+            <p:cNvPr id="18" name="Rectangle 17">
+              <a:extLst>
+                <a:ext uri="{FF2B5EF4-FFF2-40B4-BE49-F238E27FC236}">
+                  <a16:creationId xmlns:a16="http://schemas.microsoft.com/office/drawing/2014/main" id="{A047D51A-5127-1F04-E45A-2B04EAE34FA5}"/>
+                </a:ext>
+              </a:extLst>
+            </p:cNvPr>
+            <p:cNvSpPr/>
+            <p:nvPr/>
+          </p:nvSpPr>
+          <p:spPr>
+            <a:xfrm>
+              <a:off x="3123247" y="5508179"/>
+              <a:ext cx="85725" cy="95250"/>
+            </a:xfrm>
+            <a:prstGeom prst="rect">
+              <a:avLst/>
+            </a:prstGeom>
+            <a:noFill/>
+            <a:ln>
+              <a:noFill/>
+            </a:ln>
+          </p:spPr>
+          <p:style>
+            <a:lnRef idx="2">
+              <a:schemeClr val="accent1">
+                <a:shade val="15000"/>
+              </a:schemeClr>
+            </a:lnRef>
+            <a:fillRef idx="1">
+              <a:schemeClr val="accent1"/>
+            </a:fillRef>
+            <a:effectRef idx="0">
+              <a:schemeClr val="accent1"/>
+            </a:effectRef>
+            <a:fontRef idx="minor">
+              <a:schemeClr val="lt1"/>
+            </a:fontRef>
+          </p:style>
+          <p:txBody>
+            <a:bodyPr rtlCol="0" anchor="ctr"/>
+            <a:lstStyle/>
+            <a:p>
+              <a:pPr algn="ctr"/>
+              <a:endParaRPr lang="en-DK"/>
+            </a:p>
+          </p:txBody>
+        </p:sp>
+      </p:grpSp>
+      <p:grpSp>
+        <p:nvGrpSpPr>
+          <p:cNvPr id="19" name="Group 18">
+            <a:extLst>
+              <a:ext uri="{FF2B5EF4-FFF2-40B4-BE49-F238E27FC236}">
+                <a16:creationId xmlns:a16="http://schemas.microsoft.com/office/drawing/2014/main" id="{3AA21784-3A62-6477-16BF-CEFD0502DBE6}"/>
+              </a:ext>
+            </a:extLst>
+          </p:cNvPr>
+          <p:cNvGrpSpPr/>
+          <p:nvPr/>
+        </p:nvGrpSpPr>
+        <p:grpSpPr>
+          <a:xfrm>
+            <a:off x="8719841" y="1240474"/>
+            <a:ext cx="1688738" cy="1652159"/>
+            <a:chOff x="7036583" y="2686048"/>
+            <a:chExt cx="1688738" cy="1652159"/>
+          </a:xfrm>
+        </p:grpSpPr>
+        <p:pic>
+          <p:nvPicPr>
+            <p:cNvPr id="20" name="Picture 19">
+              <a:extLst>
+                <a:ext uri="{FF2B5EF4-FFF2-40B4-BE49-F238E27FC236}">
+                  <a16:creationId xmlns:a16="http://schemas.microsoft.com/office/drawing/2014/main" id="{ECA2685B-DEB8-D703-54F7-9E50BF98D0A3}"/>
+                </a:ext>
+              </a:extLst>
+            </p:cNvPr>
+            <p:cNvPicPr>
+              <a:picLocks noChangeAspect="1"/>
+            </p:cNvPicPr>
+            <p:nvPr/>
+          </p:nvPicPr>
+          <p:blipFill>
+            <a:blip r:embed="rId4"/>
+            <a:stretch>
+              <a:fillRect/>
+            </a:stretch>
+          </p:blipFill>
+          <p:spPr>
+            <a:xfrm>
+              <a:off x="7036583" y="2686048"/>
+              <a:ext cx="1688738" cy="1652159"/>
+            </a:xfrm>
+            <a:prstGeom prst="rect">
+              <a:avLst/>
+            </a:prstGeom>
+          </p:spPr>
+        </p:pic>
+        <p:sp>
+          <p:nvSpPr>
+            <p:cNvPr id="21" name="Rectangle 20">
+              <a:extLst>
+                <a:ext uri="{FF2B5EF4-FFF2-40B4-BE49-F238E27FC236}">
+                  <a16:creationId xmlns:a16="http://schemas.microsoft.com/office/drawing/2014/main" id="{27689F05-8470-CEF9-EF91-FEBEFD75159E}"/>
+                </a:ext>
+              </a:extLst>
+            </p:cNvPr>
+            <p:cNvSpPr/>
+            <p:nvPr/>
+          </p:nvSpPr>
+          <p:spPr>
+            <a:xfrm>
+              <a:off x="7838089" y="4231817"/>
+              <a:ext cx="85725" cy="95250"/>
+            </a:xfrm>
+            <a:prstGeom prst="rect">
+              <a:avLst/>
+            </a:prstGeom>
+            <a:noFill/>
+            <a:ln>
+              <a:noFill/>
+            </a:ln>
+          </p:spPr>
+          <p:style>
+            <a:lnRef idx="2">
+              <a:schemeClr val="accent1">
+                <a:shade val="15000"/>
+              </a:schemeClr>
+            </a:lnRef>
+            <a:fillRef idx="1">
+              <a:schemeClr val="accent1"/>
+            </a:fillRef>
+            <a:effectRef idx="0">
+              <a:schemeClr val="accent1"/>
+            </a:effectRef>
+            <a:fontRef idx="minor">
+              <a:schemeClr val="lt1"/>
+            </a:fontRef>
+          </p:style>
+          <p:txBody>
+            <a:bodyPr rtlCol="0" anchor="ctr"/>
+            <a:lstStyle/>
+            <a:p>
+              <a:pPr algn="ctr"/>
+              <a:endParaRPr lang="en-DK"/>
+            </a:p>
+          </p:txBody>
+        </p:sp>
+      </p:grpSp>
+      <p:grpSp>
+        <p:nvGrpSpPr>
+          <p:cNvPr id="22" name="Group 21">
+            <a:extLst>
+              <a:ext uri="{FF2B5EF4-FFF2-40B4-BE49-F238E27FC236}">
+                <a16:creationId xmlns:a16="http://schemas.microsoft.com/office/drawing/2014/main" id="{64A91F73-498C-3B19-CDC7-5FC288EDE301}"/>
+              </a:ext>
+            </a:extLst>
+          </p:cNvPr>
+          <p:cNvGrpSpPr/>
+          <p:nvPr/>
+        </p:nvGrpSpPr>
+        <p:grpSpPr>
+          <a:xfrm>
+            <a:off x="8720412" y="3341632"/>
+            <a:ext cx="1973370" cy="1732549"/>
+            <a:chOff x="5364220" y="351033"/>
+            <a:chExt cx="1973370" cy="1732549"/>
+          </a:xfrm>
+        </p:grpSpPr>
+        <p:pic>
+          <p:nvPicPr>
+            <p:cNvPr id="23" name="Picture 22">
+              <a:extLst>
+                <a:ext uri="{FF2B5EF4-FFF2-40B4-BE49-F238E27FC236}">
+                  <a16:creationId xmlns:a16="http://schemas.microsoft.com/office/drawing/2014/main" id="{8451FA48-5CA0-DA74-5D13-3E9DC33E6535}"/>
+                </a:ext>
+              </a:extLst>
+            </p:cNvPr>
+            <p:cNvPicPr>
+              <a:picLocks noChangeAspect="1"/>
+            </p:cNvPicPr>
+            <p:nvPr/>
+          </p:nvPicPr>
+          <p:blipFill>
+            <a:blip r:embed="rId5"/>
+            <a:stretch>
+              <a:fillRect/>
+            </a:stretch>
+          </p:blipFill>
+          <p:spPr>
+            <a:xfrm>
+              <a:off x="5770434" y="1091938"/>
+              <a:ext cx="1167455" cy="279258"/>
+            </a:xfrm>
+            <a:prstGeom prst="rect">
+              <a:avLst/>
+            </a:prstGeom>
+          </p:spPr>
+        </p:pic>
+        <p:grpSp>
+          <p:nvGrpSpPr>
+            <p:cNvPr id="24" name="Group 23">
+              <a:extLst>
+                <a:ext uri="{FF2B5EF4-FFF2-40B4-BE49-F238E27FC236}">
+                  <a16:creationId xmlns:a16="http://schemas.microsoft.com/office/drawing/2014/main" id="{3DBB6523-0618-8E4A-0EB4-4379C380F705}"/>
+                </a:ext>
+              </a:extLst>
+            </p:cNvPr>
+            <p:cNvGrpSpPr/>
+            <p:nvPr/>
+          </p:nvGrpSpPr>
+          <p:grpSpPr>
+            <a:xfrm>
+              <a:off x="5364220" y="351033"/>
+              <a:ext cx="1973370" cy="1732549"/>
+              <a:chOff x="5910261" y="504238"/>
+              <a:chExt cx="1973370" cy="1732549"/>
+            </a:xfrm>
+          </p:grpSpPr>
+          <p:sp>
+            <p:nvSpPr>
+              <p:cNvPr id="25" name="TextBox 24">
+                <a:extLst>
+                  <a:ext uri="{FF2B5EF4-FFF2-40B4-BE49-F238E27FC236}">
+                    <a16:creationId xmlns:a16="http://schemas.microsoft.com/office/drawing/2014/main" id="{9B0CFC0D-080E-BB74-566A-04ACFE117849}"/>
+                  </a:ext>
+                </a:extLst>
+              </p:cNvPr>
+              <p:cNvSpPr txBox="1"/>
+              <p:nvPr/>
+            </p:nvSpPr>
+            <p:spPr>
+              <a:xfrm>
+                <a:off x="5910261" y="504238"/>
+                <a:ext cx="1667059" cy="307777"/>
+              </a:xfrm>
+              <a:prstGeom prst="rect">
+                <a:avLst/>
+              </a:prstGeom>
+              <a:noFill/>
+            </p:spPr>
+            <p:txBody>
+              <a:bodyPr wrap="none" rtlCol="0">
+                <a:spAutoFit/>
+              </a:bodyPr>
+              <a:lstStyle/>
+              <a:p>
+                <a:r>
+                  <a:rPr lang="en-GB" sz="1400" dirty="0"/>
+                  <a:t>LabBench DISPLAY</a:t>
+                </a:r>
+                <a:endParaRPr lang="en-DK" sz="1400" dirty="0"/>
+              </a:p>
+            </p:txBody>
+          </p:sp>
+          <p:sp>
+            <p:nvSpPr>
+              <p:cNvPr id="26" name="Rectangle 25">
+                <a:extLst>
+                  <a:ext uri="{FF2B5EF4-FFF2-40B4-BE49-F238E27FC236}">
+                    <a16:creationId xmlns:a16="http://schemas.microsoft.com/office/drawing/2014/main" id="{38F2784A-B52C-111C-DA4A-0826EAB6D946}"/>
+                  </a:ext>
+                </a:extLst>
+              </p:cNvPr>
+              <p:cNvSpPr/>
+              <p:nvPr/>
+            </p:nvSpPr>
+            <p:spPr>
+              <a:xfrm>
+                <a:off x="5916775" y="504239"/>
+                <a:ext cx="1966856" cy="1732548"/>
+              </a:xfrm>
+              <a:prstGeom prst="rect">
+                <a:avLst/>
+              </a:prstGeom>
+              <a:noFill/>
+              <a:ln>
+                <a:solidFill>
+                  <a:schemeClr val="tx1"/>
+                </a:solidFill>
+              </a:ln>
+            </p:spPr>
+            <p:style>
+              <a:lnRef idx="2">
+                <a:schemeClr val="accent1">
+                  <a:shade val="15000"/>
+                </a:schemeClr>
+              </a:lnRef>
+              <a:fillRef idx="1">
+                <a:schemeClr val="accent1"/>
+              </a:fillRef>
+              <a:effectRef idx="0">
+                <a:schemeClr val="accent1"/>
+              </a:effectRef>
+              <a:fontRef idx="minor">
+                <a:schemeClr val="lt1"/>
+              </a:fontRef>
+            </p:style>
+            <p:txBody>
+              <a:bodyPr rtlCol="0" anchor="ctr"/>
+              <a:lstStyle/>
+              <a:p>
+                <a:pPr algn="ctr"/>
+                <a:endParaRPr lang="en-DK"/>
+              </a:p>
+            </p:txBody>
+          </p:sp>
+          <p:pic>
+            <p:nvPicPr>
+              <p:cNvPr id="27" name="Picture 26">
+                <a:extLst>
+                  <a:ext uri="{FF2B5EF4-FFF2-40B4-BE49-F238E27FC236}">
+                    <a16:creationId xmlns:a16="http://schemas.microsoft.com/office/drawing/2014/main" id="{DB59FBC7-B01F-EB52-0E72-257BF816F523}"/>
+                  </a:ext>
+                </a:extLst>
+              </p:cNvPr>
+              <p:cNvPicPr>
+                <a:picLocks noChangeAspect="1"/>
+              </p:cNvPicPr>
+              <p:nvPr/>
+            </p:nvPicPr>
+            <p:blipFill>
+              <a:blip r:embed="rId6">
+                <a:extLst>
+                  <a:ext uri="{28A0092B-C50C-407E-A947-70E740481C1C}">
+                    <a14:useLocalDpi xmlns:a14="http://schemas.microsoft.com/office/drawing/2010/main" val="0"/>
+                  </a:ext>
+                </a:extLst>
+              </a:blip>
+              <a:srcRect l="7535" t="13275" r="7301" b="13277"/>
+              <a:stretch/>
+            </p:blipFill>
+            <p:spPr>
+              <a:xfrm>
+                <a:off x="6007171" y="798114"/>
+                <a:ext cx="1786064" cy="1347788"/>
+              </a:xfrm>
+              <a:prstGeom prst="rect">
+                <a:avLst/>
+              </a:prstGeom>
+            </p:spPr>
+          </p:pic>
+        </p:grpSp>
+      </p:grpSp>
+      <p:cxnSp>
+        <p:nvCxnSpPr>
+          <p:cNvPr id="29" name="Straight Arrow Connector 28">
+            <a:extLst>
+              <a:ext uri="{FF2B5EF4-FFF2-40B4-BE49-F238E27FC236}">
+                <a16:creationId xmlns:a16="http://schemas.microsoft.com/office/drawing/2014/main" id="{7470E731-C56B-0A0D-2AEF-6ECB8E0DDD73}"/>
+              </a:ext>
+            </a:extLst>
+          </p:cNvPr>
+          <p:cNvCxnSpPr>
+            <a:stCxn id="18" idx="3"/>
+          </p:cNvCxnSpPr>
+          <p:nvPr/>
+        </p:nvCxnSpPr>
+        <p:spPr>
+          <a:xfrm>
+            <a:off x="3410761" y="4160282"/>
+            <a:ext cx="5192981" cy="47625"/>
+          </a:xfrm>
+          <a:prstGeom prst="straightConnector1">
+            <a:avLst/>
+          </a:prstGeom>
+          <a:ln w="38100">
+            <a:tailEnd type="triangle"/>
+          </a:ln>
+        </p:spPr>
+        <p:style>
+          <a:lnRef idx="2">
+            <a:schemeClr val="dk1"/>
+          </a:lnRef>
+          <a:fillRef idx="0">
+            <a:schemeClr val="dk1"/>
+          </a:fillRef>
+          <a:effectRef idx="1">
+            <a:schemeClr val="dk1"/>
+          </a:effectRef>
+          <a:fontRef idx="minor">
+            <a:schemeClr val="tx1"/>
+          </a:fontRef>
+        </p:style>
+      </p:cxnSp>
+      <p:cxnSp>
+        <p:nvCxnSpPr>
+          <p:cNvPr id="31" name="Connector: Elbow 30">
+            <a:extLst>
+              <a:ext uri="{FF2B5EF4-FFF2-40B4-BE49-F238E27FC236}">
+                <a16:creationId xmlns:a16="http://schemas.microsoft.com/office/drawing/2014/main" id="{F8B3189F-ECB0-9F46-9EF6-92A8B0C3E4A5}"/>
+              </a:ext>
+            </a:extLst>
+          </p:cNvPr>
+          <p:cNvCxnSpPr>
+            <a:stCxn id="17" idx="3"/>
+            <a:endCxn id="4" idx="2"/>
+          </p:cNvCxnSpPr>
+          <p:nvPr/>
+        </p:nvCxnSpPr>
+        <p:spPr>
+          <a:xfrm flipV="1">
+            <a:off x="3410761" y="2883108"/>
+            <a:ext cx="851677" cy="787290"/>
+          </a:xfrm>
+          <a:prstGeom prst="bentConnector2">
+            <a:avLst/>
+          </a:prstGeom>
+          <a:ln w="38100">
+            <a:tailEnd type="triangle"/>
+          </a:ln>
+        </p:spPr>
+        <p:style>
+          <a:lnRef idx="2">
+            <a:schemeClr val="dk1"/>
+          </a:lnRef>
+          <a:fillRef idx="0">
+            <a:schemeClr val="dk1"/>
+          </a:fillRef>
+          <a:effectRef idx="1">
+            <a:schemeClr val="dk1"/>
+          </a:effectRef>
+          <a:fontRef idx="minor">
+            <a:schemeClr val="tx1"/>
+          </a:fontRef>
+        </p:style>
+      </p:cxnSp>
+      <p:cxnSp>
+        <p:nvCxnSpPr>
+          <p:cNvPr id="33" name="Connector: Elbow 32">
+            <a:extLst>
+              <a:ext uri="{FF2B5EF4-FFF2-40B4-BE49-F238E27FC236}">
+                <a16:creationId xmlns:a16="http://schemas.microsoft.com/office/drawing/2014/main" id="{DF2514FA-39EA-19BC-A474-4E425B674AAF}"/>
+              </a:ext>
+            </a:extLst>
+          </p:cNvPr>
+          <p:cNvCxnSpPr>
+            <a:stCxn id="21" idx="2"/>
+            <a:endCxn id="10" idx="2"/>
+          </p:cNvCxnSpPr>
+          <p:nvPr/>
+        </p:nvCxnSpPr>
+        <p:spPr>
+          <a:xfrm rot="5400000">
+            <a:off x="8508378" y="1827275"/>
+            <a:ext cx="1615" cy="2110050"/>
+          </a:xfrm>
+          <a:prstGeom prst="bentConnector3">
+            <a:avLst>
+              <a:gd name="adj1" fmla="val 14254799"/>
+            </a:avLst>
+          </a:prstGeom>
+          <a:ln w="38100">
+            <a:tailEnd type="triangle"/>
+          </a:ln>
+        </p:spPr>
+        <p:style>
+          <a:lnRef idx="2">
+            <a:schemeClr val="dk1"/>
+          </a:lnRef>
+          <a:fillRef idx="0">
+            <a:schemeClr val="dk1"/>
+          </a:fillRef>
+          <a:effectRef idx="1">
+            <a:schemeClr val="dk1"/>
+          </a:effectRef>
+          <a:fontRef idx="minor">
+            <a:schemeClr val="tx1"/>
+          </a:fontRef>
+        </p:style>
+      </p:cxnSp>
+    </p:spTree>
+    <p:extLst>
+      <p:ext uri="{BB962C8B-B14F-4D97-AF65-F5344CB8AC3E}">
+        <p14:creationId xmlns:p14="http://schemas.microsoft.com/office/powerpoint/2010/main" val="4207926074"/>
+      </p:ext>
+    </p:extLst>
+  </p:cSld>
+  <p:clrMapOvr>
+    <a:masterClrMapping/>
+  </p:clrMapOvr>
+</p:sld>
+</file>
+
+<file path=ppt/slides/slide6.xml><?xml version="1.0" encoding="utf-8"?>
+<p:sld xmlns:a="http://schemas.openxmlformats.org/drawingml/2006/main" xmlns:r="http://schemas.openxmlformats.org/officeDocument/2006/relationships" xmlns:p="http://schemas.openxmlformats.org/presentationml/2006/main">
+  <p:cSld>
+    <p:spTree>
+      <p:nvGrpSpPr>
+        <p:cNvPr id="1" name=""/>
+        <p:cNvGrpSpPr/>
+        <p:nvPr/>
+      </p:nvGrpSpPr>
+      <p:grpSpPr>
+        <a:xfrm>
+          <a:off x="0" y="0"/>
+          <a:ext cx="0" cy="0"/>
+          <a:chOff x="0" y="0"/>
+          <a:chExt cx="0" cy="0"/>
+        </a:xfrm>
+      </p:grpSpPr>
+      <p:grpSp>
+        <p:nvGrpSpPr>
+          <p:cNvPr id="2" name="Group 1">
+            <a:extLst>
+              <a:ext uri="{FF2B5EF4-FFF2-40B4-BE49-F238E27FC236}">
+                <a16:creationId xmlns:a16="http://schemas.microsoft.com/office/drawing/2014/main" id="{A169597D-F047-A829-11BE-DF5FC18836BA}"/>
+              </a:ext>
+            </a:extLst>
+          </p:cNvPr>
+          <p:cNvGrpSpPr/>
+          <p:nvPr/>
+        </p:nvGrpSpPr>
+        <p:grpSpPr>
+          <a:xfrm>
+            <a:off x="2258820" y="2917935"/>
+            <a:ext cx="2749534" cy="1676545"/>
+            <a:chOff x="469970" y="4181402"/>
+            <a:chExt cx="2749534" cy="1676545"/>
+          </a:xfrm>
+        </p:grpSpPr>
+        <p:pic>
+          <p:nvPicPr>
+            <p:cNvPr id="3" name="Picture 2">
+              <a:extLst>
+                <a:ext uri="{FF2B5EF4-FFF2-40B4-BE49-F238E27FC236}">
+                  <a16:creationId xmlns:a16="http://schemas.microsoft.com/office/drawing/2014/main" id="{7D6A3E85-4FC0-8366-0A32-D4164273455C}"/>
+                </a:ext>
+              </a:extLst>
+            </p:cNvPr>
+            <p:cNvPicPr>
+              <a:picLocks noChangeAspect="1"/>
+            </p:cNvPicPr>
+            <p:nvPr/>
+          </p:nvPicPr>
+          <p:blipFill>
+            <a:blip r:embed="rId2"/>
+            <a:stretch>
+              <a:fillRect/>
+            </a:stretch>
+          </p:blipFill>
+          <p:spPr>
+            <a:xfrm>
+              <a:off x="469970" y="4181402"/>
+              <a:ext cx="2749534" cy="1676545"/>
+            </a:xfrm>
+            <a:prstGeom prst="rect">
+              <a:avLst/>
+            </a:prstGeom>
+          </p:spPr>
+        </p:pic>
+        <p:sp>
+          <p:nvSpPr>
+            <p:cNvPr id="4" name="Rectangle 3">
+              <a:extLst>
+                <a:ext uri="{FF2B5EF4-FFF2-40B4-BE49-F238E27FC236}">
+                  <a16:creationId xmlns:a16="http://schemas.microsoft.com/office/drawing/2014/main" id="{FBF899A4-2928-B53E-84DD-6D3F5F7B738C}"/>
+                </a:ext>
+              </a:extLst>
+            </p:cNvPr>
+            <p:cNvSpPr/>
+            <p:nvPr/>
+          </p:nvSpPr>
+          <p:spPr>
+            <a:xfrm>
+              <a:off x="3123247" y="4323267"/>
+              <a:ext cx="85725" cy="95250"/>
+            </a:xfrm>
+            <a:prstGeom prst="rect">
+              <a:avLst/>
+            </a:prstGeom>
+            <a:noFill/>
+            <a:ln>
+              <a:noFill/>
+            </a:ln>
+          </p:spPr>
+          <p:style>
+            <a:lnRef idx="2">
+              <a:schemeClr val="accent1">
+                <a:shade val="15000"/>
+              </a:schemeClr>
+            </a:lnRef>
+            <a:fillRef idx="1">
+              <a:schemeClr val="accent1"/>
+            </a:fillRef>
+            <a:effectRef idx="0">
+              <a:schemeClr val="accent1"/>
+            </a:effectRef>
+            <a:fontRef idx="minor">
+              <a:schemeClr val="lt1"/>
+            </a:fontRef>
+          </p:style>
+          <p:txBody>
+            <a:bodyPr rtlCol="0" anchor="ctr"/>
+            <a:lstStyle/>
+            <a:p>
+              <a:pPr algn="ctr"/>
+              <a:endParaRPr lang="en-DK"/>
+            </a:p>
+          </p:txBody>
+        </p:sp>
+        <p:sp>
+          <p:nvSpPr>
+            <p:cNvPr id="5" name="Rectangle 4">
+              <a:extLst>
+                <a:ext uri="{FF2B5EF4-FFF2-40B4-BE49-F238E27FC236}">
+                  <a16:creationId xmlns:a16="http://schemas.microsoft.com/office/drawing/2014/main" id="{C03F5FA7-3B9F-42C2-8D48-325AFC513170}"/>
+                </a:ext>
+              </a:extLst>
+            </p:cNvPr>
+            <p:cNvSpPr/>
+            <p:nvPr/>
+          </p:nvSpPr>
+          <p:spPr>
+            <a:xfrm>
+              <a:off x="3123247" y="4566511"/>
+              <a:ext cx="85725" cy="95250"/>
+            </a:xfrm>
+            <a:prstGeom prst="rect">
+              <a:avLst/>
+            </a:prstGeom>
+            <a:noFill/>
+            <a:ln>
+              <a:noFill/>
+            </a:ln>
+          </p:spPr>
+          <p:style>
+            <a:lnRef idx="2">
+              <a:schemeClr val="accent1">
+                <a:shade val="15000"/>
+              </a:schemeClr>
+            </a:lnRef>
+            <a:fillRef idx="1">
+              <a:schemeClr val="accent1"/>
+            </a:fillRef>
+            <a:effectRef idx="0">
+              <a:schemeClr val="accent1"/>
+            </a:effectRef>
+            <a:fontRef idx="minor">
+              <a:schemeClr val="lt1"/>
+            </a:fontRef>
+          </p:style>
+          <p:txBody>
+            <a:bodyPr rtlCol="0" anchor="ctr"/>
+            <a:lstStyle/>
+            <a:p>
+              <a:pPr algn="ctr"/>
+              <a:endParaRPr lang="en-DK"/>
+            </a:p>
+          </p:txBody>
+        </p:sp>
+        <p:sp>
+          <p:nvSpPr>
+            <p:cNvPr id="6" name="Rectangle 5">
+              <a:extLst>
+                <a:ext uri="{FF2B5EF4-FFF2-40B4-BE49-F238E27FC236}">
+                  <a16:creationId xmlns:a16="http://schemas.microsoft.com/office/drawing/2014/main" id="{B51BCDF6-D034-AB3E-74A9-3A46B5C77B0D}"/>
+                </a:ext>
+              </a:extLst>
+            </p:cNvPr>
+            <p:cNvSpPr/>
+            <p:nvPr/>
+          </p:nvSpPr>
+          <p:spPr>
+            <a:xfrm>
+              <a:off x="3123247" y="4803626"/>
+              <a:ext cx="85725" cy="95250"/>
+            </a:xfrm>
+            <a:prstGeom prst="rect">
+              <a:avLst/>
+            </a:prstGeom>
+            <a:noFill/>
+            <a:ln>
+              <a:noFill/>
+            </a:ln>
+          </p:spPr>
+          <p:style>
+            <a:lnRef idx="2">
+              <a:schemeClr val="accent1">
+                <a:shade val="15000"/>
+              </a:schemeClr>
+            </a:lnRef>
+            <a:fillRef idx="1">
+              <a:schemeClr val="accent1"/>
+            </a:fillRef>
+            <a:effectRef idx="0">
+              <a:schemeClr val="accent1"/>
+            </a:effectRef>
+            <a:fontRef idx="minor">
+              <a:schemeClr val="lt1"/>
+            </a:fontRef>
+          </p:style>
+          <p:txBody>
+            <a:bodyPr rtlCol="0" anchor="ctr"/>
+            <a:lstStyle/>
+            <a:p>
+              <a:pPr algn="ctr"/>
+              <a:endParaRPr lang="en-DK"/>
+            </a:p>
+          </p:txBody>
+        </p:sp>
+        <p:sp>
+          <p:nvSpPr>
+            <p:cNvPr id="7" name="Rectangle 6">
+              <a:extLst>
+                <a:ext uri="{FF2B5EF4-FFF2-40B4-BE49-F238E27FC236}">
+                  <a16:creationId xmlns:a16="http://schemas.microsoft.com/office/drawing/2014/main" id="{B426221E-FFA8-2B37-9095-DE82E0D253F9}"/>
+                </a:ext>
+              </a:extLst>
+            </p:cNvPr>
+            <p:cNvSpPr/>
+            <p:nvPr/>
+          </p:nvSpPr>
+          <p:spPr>
+            <a:xfrm>
+              <a:off x="3123247" y="5018295"/>
+              <a:ext cx="85725" cy="95250"/>
+            </a:xfrm>
+            <a:prstGeom prst="rect">
+              <a:avLst/>
+            </a:prstGeom>
+            <a:noFill/>
+            <a:ln>
+              <a:noFill/>
+            </a:ln>
+          </p:spPr>
+          <p:style>
+            <a:lnRef idx="2">
+              <a:schemeClr val="accent1">
+                <a:shade val="15000"/>
+              </a:schemeClr>
+            </a:lnRef>
+            <a:fillRef idx="1">
+              <a:schemeClr val="accent1"/>
+            </a:fillRef>
+            <a:effectRef idx="0">
+              <a:schemeClr val="accent1"/>
+            </a:effectRef>
+            <a:fontRef idx="minor">
+              <a:schemeClr val="lt1"/>
+            </a:fontRef>
+          </p:style>
+          <p:txBody>
+            <a:bodyPr rtlCol="0" anchor="ctr"/>
+            <a:lstStyle/>
+            <a:p>
+              <a:pPr algn="ctr"/>
+              <a:endParaRPr lang="en-DK"/>
+            </a:p>
+          </p:txBody>
+        </p:sp>
+        <p:sp>
+          <p:nvSpPr>
+            <p:cNvPr id="8" name="Rectangle 7">
+              <a:extLst>
+                <a:ext uri="{FF2B5EF4-FFF2-40B4-BE49-F238E27FC236}">
+                  <a16:creationId xmlns:a16="http://schemas.microsoft.com/office/drawing/2014/main" id="{319F0D51-74C2-A79B-71F2-DC5775D3F62B}"/>
+                </a:ext>
+              </a:extLst>
+            </p:cNvPr>
+            <p:cNvSpPr/>
+            <p:nvPr/>
+          </p:nvSpPr>
+          <p:spPr>
+            <a:xfrm>
+              <a:off x="3123247" y="5508179"/>
+              <a:ext cx="85725" cy="95250"/>
+            </a:xfrm>
+            <a:prstGeom prst="rect">
+              <a:avLst/>
+            </a:prstGeom>
+            <a:noFill/>
+            <a:ln>
+              <a:noFill/>
+            </a:ln>
+          </p:spPr>
+          <p:style>
+            <a:lnRef idx="2">
+              <a:schemeClr val="accent1">
+                <a:shade val="15000"/>
+              </a:schemeClr>
+            </a:lnRef>
+            <a:fillRef idx="1">
+              <a:schemeClr val="accent1"/>
+            </a:fillRef>
+            <a:effectRef idx="0">
+              <a:schemeClr val="accent1"/>
+            </a:effectRef>
+            <a:fontRef idx="minor">
+              <a:schemeClr val="lt1"/>
+            </a:fontRef>
+          </p:style>
+          <p:txBody>
+            <a:bodyPr rtlCol="0" anchor="ctr"/>
+            <a:lstStyle/>
+            <a:p>
+              <a:pPr algn="ctr"/>
+              <a:endParaRPr lang="en-DK"/>
+            </a:p>
+          </p:txBody>
+        </p:sp>
+      </p:grpSp>
+      <p:grpSp>
+        <p:nvGrpSpPr>
+          <p:cNvPr id="9" name="Group 8">
+            <a:extLst>
+              <a:ext uri="{FF2B5EF4-FFF2-40B4-BE49-F238E27FC236}">
+                <a16:creationId xmlns:a16="http://schemas.microsoft.com/office/drawing/2014/main" id="{44467B8C-FB06-E0A9-B11C-FFB1ADD50E93}"/>
+              </a:ext>
+            </a:extLst>
+          </p:cNvPr>
+          <p:cNvGrpSpPr/>
+          <p:nvPr/>
+        </p:nvGrpSpPr>
+        <p:grpSpPr>
+          <a:xfrm>
+            <a:off x="6275963" y="3414063"/>
+            <a:ext cx="1973370" cy="1732549"/>
+            <a:chOff x="5364220" y="351033"/>
+            <a:chExt cx="1973370" cy="1732549"/>
+          </a:xfrm>
+        </p:grpSpPr>
+        <p:pic>
+          <p:nvPicPr>
+            <p:cNvPr id="10" name="Picture 9">
+              <a:extLst>
+                <a:ext uri="{FF2B5EF4-FFF2-40B4-BE49-F238E27FC236}">
+                  <a16:creationId xmlns:a16="http://schemas.microsoft.com/office/drawing/2014/main" id="{E1A761A1-27DE-8A22-A819-05835791C099}"/>
+                </a:ext>
+              </a:extLst>
+            </p:cNvPr>
+            <p:cNvPicPr>
+              <a:picLocks noChangeAspect="1"/>
+            </p:cNvPicPr>
+            <p:nvPr/>
+          </p:nvPicPr>
+          <p:blipFill>
+            <a:blip r:embed="rId3"/>
+            <a:stretch>
+              <a:fillRect/>
+            </a:stretch>
+          </p:blipFill>
+          <p:spPr>
+            <a:xfrm>
+              <a:off x="5770434" y="1091938"/>
+              <a:ext cx="1167455" cy="279258"/>
+            </a:xfrm>
+            <a:prstGeom prst="rect">
+              <a:avLst/>
+            </a:prstGeom>
+          </p:spPr>
+        </p:pic>
+        <p:grpSp>
+          <p:nvGrpSpPr>
+            <p:cNvPr id="11" name="Group 10">
+              <a:extLst>
+                <a:ext uri="{FF2B5EF4-FFF2-40B4-BE49-F238E27FC236}">
+                  <a16:creationId xmlns:a16="http://schemas.microsoft.com/office/drawing/2014/main" id="{911CB86C-991A-D24B-0C5C-C604EDCFAD38}"/>
+                </a:ext>
+              </a:extLst>
+            </p:cNvPr>
+            <p:cNvGrpSpPr/>
+            <p:nvPr/>
+          </p:nvGrpSpPr>
+          <p:grpSpPr>
+            <a:xfrm>
+              <a:off x="5364220" y="351033"/>
+              <a:ext cx="1973370" cy="1732549"/>
+              <a:chOff x="5910261" y="504238"/>
+              <a:chExt cx="1973370" cy="1732549"/>
+            </a:xfrm>
+          </p:grpSpPr>
+          <p:sp>
+            <p:nvSpPr>
+              <p:cNvPr id="12" name="TextBox 11">
+                <a:extLst>
+                  <a:ext uri="{FF2B5EF4-FFF2-40B4-BE49-F238E27FC236}">
+                    <a16:creationId xmlns:a16="http://schemas.microsoft.com/office/drawing/2014/main" id="{AF579EBB-DE9C-3020-D38F-994625FE7C31}"/>
+                  </a:ext>
+                </a:extLst>
+              </p:cNvPr>
+              <p:cNvSpPr txBox="1"/>
+              <p:nvPr/>
+            </p:nvSpPr>
+            <p:spPr>
+              <a:xfrm>
+                <a:off x="5910261" y="504238"/>
+                <a:ext cx="1667059" cy="307777"/>
+              </a:xfrm>
+              <a:prstGeom prst="rect">
+                <a:avLst/>
+              </a:prstGeom>
+              <a:noFill/>
+            </p:spPr>
+            <p:txBody>
+              <a:bodyPr wrap="none" rtlCol="0">
+                <a:spAutoFit/>
+              </a:bodyPr>
+              <a:lstStyle/>
+              <a:p>
+                <a:r>
+                  <a:rPr lang="en-GB" sz="1400" dirty="0"/>
+                  <a:t>LabBench DISPLAY</a:t>
+                </a:r>
+                <a:endParaRPr lang="en-DK" sz="1400" dirty="0"/>
+              </a:p>
+            </p:txBody>
+          </p:sp>
+          <p:sp>
+            <p:nvSpPr>
+              <p:cNvPr id="13" name="Rectangle 12">
+                <a:extLst>
+                  <a:ext uri="{FF2B5EF4-FFF2-40B4-BE49-F238E27FC236}">
+                    <a16:creationId xmlns:a16="http://schemas.microsoft.com/office/drawing/2014/main" id="{BE1415AD-DFC3-78BF-F06D-98988ED98B89}"/>
+                  </a:ext>
+                </a:extLst>
+              </p:cNvPr>
+              <p:cNvSpPr/>
+              <p:nvPr/>
+            </p:nvSpPr>
+            <p:spPr>
+              <a:xfrm>
+                <a:off x="5916775" y="504239"/>
+                <a:ext cx="1966856" cy="1732548"/>
+              </a:xfrm>
+              <a:prstGeom prst="rect">
+                <a:avLst/>
+              </a:prstGeom>
+              <a:noFill/>
+              <a:ln>
+                <a:solidFill>
+                  <a:schemeClr val="tx1"/>
+                </a:solidFill>
+              </a:ln>
+            </p:spPr>
+            <p:style>
+              <a:lnRef idx="2">
+                <a:schemeClr val="accent1">
+                  <a:shade val="15000"/>
+                </a:schemeClr>
+              </a:lnRef>
+              <a:fillRef idx="1">
+                <a:schemeClr val="accent1"/>
+              </a:fillRef>
+              <a:effectRef idx="0">
+                <a:schemeClr val="accent1"/>
+              </a:effectRef>
+              <a:fontRef idx="minor">
+                <a:schemeClr val="lt1"/>
+              </a:fontRef>
+            </p:style>
+            <p:txBody>
+              <a:bodyPr rtlCol="0" anchor="ctr"/>
+              <a:lstStyle/>
+              <a:p>
+                <a:pPr algn="ctr"/>
+                <a:endParaRPr lang="en-DK"/>
+              </a:p>
+            </p:txBody>
+          </p:sp>
+          <p:pic>
+            <p:nvPicPr>
+              <p:cNvPr id="14" name="Picture 13">
+                <a:extLst>
+                  <a:ext uri="{FF2B5EF4-FFF2-40B4-BE49-F238E27FC236}">
+                    <a16:creationId xmlns:a16="http://schemas.microsoft.com/office/drawing/2014/main" id="{5C0CE7FE-BE6E-A72F-E9E8-6576638B6731}"/>
+                  </a:ext>
+                </a:extLst>
+              </p:cNvPr>
+              <p:cNvPicPr>
+                <a:picLocks noChangeAspect="1"/>
+              </p:cNvPicPr>
+              <p:nvPr/>
+            </p:nvPicPr>
+            <p:blipFill>
+              <a:blip r:embed="rId4">
+                <a:extLst>
+                  <a:ext uri="{28A0092B-C50C-407E-A947-70E740481C1C}">
+                    <a14:useLocalDpi xmlns:a14="http://schemas.microsoft.com/office/drawing/2010/main" val="0"/>
+                  </a:ext>
+                </a:extLst>
+              </a:blip>
+              <a:srcRect l="7535" t="13275" r="7301" b="13277"/>
+              <a:stretch/>
+            </p:blipFill>
+            <p:spPr>
+              <a:xfrm>
+                <a:off x="6007171" y="798114"/>
+                <a:ext cx="1786064" cy="1347788"/>
+              </a:xfrm>
+              <a:prstGeom prst="rect">
+                <a:avLst/>
+              </a:prstGeom>
+            </p:spPr>
+          </p:pic>
+        </p:grpSp>
+      </p:grpSp>
+      <p:pic>
+        <p:nvPicPr>
+          <p:cNvPr id="15" name="Picture 14">
+            <a:extLst>
+              <a:ext uri="{FF2B5EF4-FFF2-40B4-BE49-F238E27FC236}">
+                <a16:creationId xmlns:a16="http://schemas.microsoft.com/office/drawing/2014/main" id="{D9DB77FA-5C5E-5E50-6495-C514DC106E78}"/>
+              </a:ext>
+            </a:extLst>
+          </p:cNvPr>
+          <p:cNvPicPr>
+            <a:picLocks noChangeAspect="1"/>
+          </p:cNvPicPr>
+          <p:nvPr/>
+        </p:nvPicPr>
+        <p:blipFill>
+          <a:blip r:embed="rId5"/>
+          <a:stretch>
+            <a:fillRect/>
+          </a:stretch>
+        </p:blipFill>
+        <p:spPr>
+          <a:xfrm>
+            <a:off x="6275963" y="1137009"/>
+            <a:ext cx="2005758" cy="1518036"/>
+          </a:xfrm>
+          <a:prstGeom prst="rect">
+            <a:avLst/>
+          </a:prstGeom>
+        </p:spPr>
+      </p:pic>
+      <p:cxnSp>
+        <p:nvCxnSpPr>
+          <p:cNvPr id="16" name="Straight Arrow Connector 15">
+            <a:extLst>
+              <a:ext uri="{FF2B5EF4-FFF2-40B4-BE49-F238E27FC236}">
+                <a16:creationId xmlns:a16="http://schemas.microsoft.com/office/drawing/2014/main" id="{22E9FA1A-E65F-895D-9525-810C3BE62546}"/>
+              </a:ext>
+            </a:extLst>
+          </p:cNvPr>
+          <p:cNvCxnSpPr>
+            <a:cxnSpLocks/>
+            <a:stCxn id="8" idx="3"/>
+            <a:endCxn id="13" idx="1"/>
+          </p:cNvCxnSpPr>
+          <p:nvPr/>
+        </p:nvCxnSpPr>
+        <p:spPr>
+          <a:xfrm flipV="1">
+            <a:off x="4997822" y="4280338"/>
+            <a:ext cx="1284655" cy="11999"/>
+          </a:xfrm>
+          <a:prstGeom prst="straightConnector1">
+            <a:avLst/>
+          </a:prstGeom>
+          <a:ln w="38100">
+            <a:tailEnd type="triangle"/>
+          </a:ln>
+        </p:spPr>
+        <p:style>
+          <a:lnRef idx="2">
+            <a:schemeClr val="dk1"/>
+          </a:lnRef>
+          <a:fillRef idx="0">
+            <a:schemeClr val="dk1"/>
+          </a:fillRef>
+          <a:effectRef idx="1">
+            <a:schemeClr val="dk1"/>
+          </a:effectRef>
+          <a:fontRef idx="minor">
+            <a:schemeClr val="tx1"/>
+          </a:fontRef>
+        </p:style>
+      </p:cxnSp>
+      <p:cxnSp>
+        <p:nvCxnSpPr>
+          <p:cNvPr id="20" name="Connector: Elbow 19">
+            <a:extLst>
+              <a:ext uri="{FF2B5EF4-FFF2-40B4-BE49-F238E27FC236}">
+                <a16:creationId xmlns:a16="http://schemas.microsoft.com/office/drawing/2014/main" id="{551EBCD8-06C7-658B-79D4-59104E11651C}"/>
+              </a:ext>
+            </a:extLst>
+          </p:cNvPr>
+          <p:cNvCxnSpPr>
+            <a:stCxn id="4" idx="3"/>
+            <a:endCxn id="15" idx="2"/>
+          </p:cNvCxnSpPr>
+          <p:nvPr/>
+        </p:nvCxnSpPr>
+        <p:spPr>
+          <a:xfrm flipV="1">
+            <a:off x="4997822" y="2655045"/>
+            <a:ext cx="2281020" cy="452380"/>
+          </a:xfrm>
+          <a:prstGeom prst="bentConnector2">
+            <a:avLst/>
+          </a:prstGeom>
+          <a:ln w="38100">
+            <a:tailEnd type="triangle"/>
+          </a:ln>
+        </p:spPr>
+        <p:style>
+          <a:lnRef idx="2">
+            <a:schemeClr val="dk1"/>
+          </a:lnRef>
+          <a:fillRef idx="0">
+            <a:schemeClr val="dk1"/>
+          </a:fillRef>
+          <a:effectRef idx="1">
+            <a:schemeClr val="dk1"/>
+          </a:effectRef>
+          <a:fontRef idx="minor">
+            <a:schemeClr val="tx1"/>
+          </a:fontRef>
+        </p:style>
+      </p:cxnSp>
+    </p:spTree>
+    <p:extLst>
+      <p:ext uri="{BB962C8B-B14F-4D97-AF65-F5344CB8AC3E}">
+        <p14:creationId xmlns:p14="http://schemas.microsoft.com/office/powerpoint/2010/main" val="632197581"/>
       </p:ext>
     </p:extLst>
   </p:cSld>

</xml_diff>